<commit_message>
add database design and a piece of global code
</commit_message>
<xml_diff>
--- a/Presentation_TP_Larisa.pptx
+++ b/Presentation_TP_Larisa.pptx
@@ -10,8 +10,8 @@
     <p:sldId id="258" r:id="rId4"/>
     <p:sldId id="259" r:id="rId5"/>
     <p:sldId id="260" r:id="rId6"/>
-    <p:sldId id="261" r:id="rId7"/>
-    <p:sldId id="264" r:id="rId8"/>
+    <p:sldId id="264" r:id="rId7"/>
+    <p:sldId id="261" r:id="rId8"/>
     <p:sldId id="262" r:id="rId9"/>
     <p:sldId id="263" r:id="rId10"/>
     <p:sldId id="265" r:id="rId11"/>
@@ -174,7 +174,7 @@
           <a:noFill/>
           <a:extLst>
             <a:ext uri="{909E8E84-426E-40dd-AFC4-6F175D3DCCD1}">
-              <a14:hiddenFill xmlns:a14="http://schemas.microsoft.com/office/drawing/2010/main" xmlns="">
+              <a14:hiddenFill xmlns="" xmlns:a14="http://schemas.microsoft.com/office/drawing/2010/main">
                 <a:solidFill>
                   <a:srgbClr val="FFFFFF"/>
                 </a:solidFill>
@@ -234,7 +234,7 @@
             </a:ln>
             <a:extLst>
               <a:ext uri="{91240B29-F687-4f45-9708-019B960494DF}">
-                <a14:hiddenLine xmlns:a14="http://schemas.microsoft.com/office/drawing/2010/main" xmlns="" w="9525">
+                <a14:hiddenLine xmlns="" xmlns:a14="http://schemas.microsoft.com/office/drawing/2010/main" w="9525">
                   <a:solidFill>
                     <a:srgbClr val="000000"/>
                   </a:solidFill>
@@ -324,7 +324,7 @@
             </a:ln>
             <a:extLst>
               <a:ext uri="{91240B29-F687-4f45-9708-019B960494DF}">
-                <a14:hiddenLine xmlns:a14="http://schemas.microsoft.com/office/drawing/2010/main" xmlns="" w="9525">
+                <a14:hiddenLine xmlns="" xmlns:a14="http://schemas.microsoft.com/office/drawing/2010/main" w="9525">
                   <a:solidFill>
                     <a:srgbClr val="000000"/>
                   </a:solidFill>
@@ -414,7 +414,7 @@
             </a:ln>
             <a:extLst>
               <a:ext uri="{91240B29-F687-4f45-9708-019B960494DF}">
-                <a14:hiddenLine xmlns:a14="http://schemas.microsoft.com/office/drawing/2010/main" xmlns="" w="9525">
+                <a14:hiddenLine xmlns="" xmlns:a14="http://schemas.microsoft.com/office/drawing/2010/main" w="9525">
                   <a:solidFill>
                     <a:srgbClr val="000000"/>
                   </a:solidFill>
@@ -448,7 +448,7 @@
             </a:ln>
             <a:extLst>
               <a:ext uri="{91240B29-F687-4f45-9708-019B960494DF}">
-                <a14:hiddenLine xmlns:a14="http://schemas.microsoft.com/office/drawing/2010/main" xmlns="" w="9525">
+                <a14:hiddenLine xmlns="" xmlns:a14="http://schemas.microsoft.com/office/drawing/2010/main" w="9525">
                   <a:solidFill>
                     <a:srgbClr val="000000"/>
                   </a:solidFill>
@@ -538,7 +538,7 @@
             </a:ln>
             <a:extLst>
               <a:ext uri="{91240B29-F687-4f45-9708-019B960494DF}">
-                <a14:hiddenLine xmlns:a14="http://schemas.microsoft.com/office/drawing/2010/main" xmlns="" w="9525">
+                <a14:hiddenLine xmlns="" xmlns:a14="http://schemas.microsoft.com/office/drawing/2010/main" w="9525">
                   <a:solidFill>
                     <a:srgbClr val="000000"/>
                   </a:solidFill>
@@ -600,7 +600,7 @@
             </a:ln>
             <a:extLst>
               <a:ext uri="{91240B29-F687-4f45-9708-019B960494DF}">
-                <a14:hiddenLine xmlns:a14="http://schemas.microsoft.com/office/drawing/2010/main" xmlns="" w="9525">
+                <a14:hiddenLine xmlns="" xmlns:a14="http://schemas.microsoft.com/office/drawing/2010/main" w="9525">
                   <a:solidFill>
                     <a:srgbClr val="000000"/>
                   </a:solidFill>
@@ -662,7 +662,7 @@
             </a:ln>
             <a:extLst>
               <a:ext uri="{91240B29-F687-4f45-9708-019B960494DF}">
-                <a14:hiddenLine xmlns:a14="http://schemas.microsoft.com/office/drawing/2010/main" xmlns="" w="9525">
+                <a14:hiddenLine xmlns="" xmlns:a14="http://schemas.microsoft.com/office/drawing/2010/main" w="9525">
                   <a:solidFill>
                     <a:srgbClr val="000000"/>
                   </a:solidFill>
@@ -752,7 +752,7 @@
             </a:ln>
             <a:extLst>
               <a:ext uri="{91240B29-F687-4f45-9708-019B960494DF}">
-                <a14:hiddenLine xmlns:a14="http://schemas.microsoft.com/office/drawing/2010/main" xmlns="" w="9525">
+                <a14:hiddenLine xmlns="" xmlns:a14="http://schemas.microsoft.com/office/drawing/2010/main" w="9525">
                   <a:solidFill>
                     <a:srgbClr val="000000"/>
                   </a:solidFill>
@@ -814,7 +814,7 @@
             </a:ln>
             <a:extLst>
               <a:ext uri="{91240B29-F687-4f45-9708-019B960494DF}">
-                <a14:hiddenLine xmlns:a14="http://schemas.microsoft.com/office/drawing/2010/main" xmlns="" w="9525">
+                <a14:hiddenLine xmlns="" xmlns:a14="http://schemas.microsoft.com/office/drawing/2010/main" w="9525">
                   <a:solidFill>
                     <a:srgbClr val="000000"/>
                   </a:solidFill>
@@ -876,7 +876,7 @@
             </a:ln>
             <a:extLst>
               <a:ext uri="{91240B29-F687-4f45-9708-019B960494DF}">
-                <a14:hiddenLine xmlns:a14="http://schemas.microsoft.com/office/drawing/2010/main" xmlns="" w="9525">
+                <a14:hiddenLine xmlns="" xmlns:a14="http://schemas.microsoft.com/office/drawing/2010/main" w="9525">
                   <a:solidFill>
                     <a:srgbClr val="000000"/>
                   </a:solidFill>
@@ -966,7 +966,7 @@
             </a:ln>
             <a:extLst>
               <a:ext uri="{91240B29-F687-4f45-9708-019B960494DF}">
-                <a14:hiddenLine xmlns:a14="http://schemas.microsoft.com/office/drawing/2010/main" xmlns="" w="9525">
+                <a14:hiddenLine xmlns="" xmlns:a14="http://schemas.microsoft.com/office/drawing/2010/main" w="9525">
                   <a:solidFill>
                     <a:srgbClr val="000000"/>
                   </a:solidFill>
@@ -1056,7 +1056,7 @@
             </a:ln>
             <a:extLst>
               <a:ext uri="{91240B29-F687-4f45-9708-019B960494DF}">
-                <a14:hiddenLine xmlns:a14="http://schemas.microsoft.com/office/drawing/2010/main" xmlns="" w="9525">
+                <a14:hiddenLine xmlns="" xmlns:a14="http://schemas.microsoft.com/office/drawing/2010/main" w="9525">
                   <a:solidFill>
                     <a:srgbClr val="000000"/>
                   </a:solidFill>
@@ -1118,7 +1118,7 @@
             </a:ln>
             <a:extLst>
               <a:ext uri="{91240B29-F687-4f45-9708-019B960494DF}">
-                <a14:hiddenLine xmlns:a14="http://schemas.microsoft.com/office/drawing/2010/main" xmlns="" w="9525">
+                <a14:hiddenLine xmlns="" xmlns:a14="http://schemas.microsoft.com/office/drawing/2010/main" w="9525">
                   <a:solidFill>
                     <a:srgbClr val="000000"/>
                   </a:solidFill>
@@ -1228,7 +1228,7 @@
             </a:ln>
             <a:extLst>
               <a:ext uri="{91240B29-F687-4f45-9708-019B960494DF}">
-                <a14:hiddenLine xmlns:a14="http://schemas.microsoft.com/office/drawing/2010/main" xmlns="" w="9525">
+                <a14:hiddenLine xmlns="" xmlns:a14="http://schemas.microsoft.com/office/drawing/2010/main" w="9525">
                   <a:solidFill>
                     <a:srgbClr val="000000"/>
                   </a:solidFill>
@@ -1290,7 +1290,7 @@
             </a:ln>
             <a:extLst>
               <a:ext uri="{91240B29-F687-4f45-9708-019B960494DF}">
-                <a14:hiddenLine xmlns:a14="http://schemas.microsoft.com/office/drawing/2010/main" xmlns="" w="9525">
+                <a14:hiddenLine xmlns="" xmlns:a14="http://schemas.microsoft.com/office/drawing/2010/main" w="9525">
                   <a:solidFill>
                     <a:srgbClr val="000000"/>
                   </a:solidFill>
@@ -1380,7 +1380,7 @@
             </a:ln>
             <a:extLst>
               <a:ext uri="{91240B29-F687-4f45-9708-019B960494DF}">
-                <a14:hiddenLine xmlns:a14="http://schemas.microsoft.com/office/drawing/2010/main" xmlns="" w="9525">
+                <a14:hiddenLine xmlns="" xmlns:a14="http://schemas.microsoft.com/office/drawing/2010/main" w="9525">
                   <a:solidFill>
                     <a:srgbClr val="000000"/>
                   </a:solidFill>
@@ -1470,7 +1470,7 @@
             </a:ln>
             <a:extLst>
               <a:ext uri="{91240B29-F687-4f45-9708-019B960494DF}">
-                <a14:hiddenLine xmlns:a14="http://schemas.microsoft.com/office/drawing/2010/main" xmlns="" w="9525">
+                <a14:hiddenLine xmlns="" xmlns:a14="http://schemas.microsoft.com/office/drawing/2010/main" w="9525">
                   <a:solidFill>
                     <a:srgbClr val="000000"/>
                   </a:solidFill>
@@ -1532,7 +1532,7 @@
             </a:ln>
             <a:extLst>
               <a:ext uri="{91240B29-F687-4f45-9708-019B960494DF}">
-                <a14:hiddenLine xmlns:a14="http://schemas.microsoft.com/office/drawing/2010/main" xmlns="" w="9525">
+                <a14:hiddenLine xmlns="" xmlns:a14="http://schemas.microsoft.com/office/drawing/2010/main" w="9525">
                   <a:solidFill>
                     <a:srgbClr val="000000"/>
                   </a:solidFill>
@@ -1622,7 +1622,7 @@
             </a:ln>
             <a:extLst>
               <a:ext uri="{91240B29-F687-4f45-9708-019B960494DF}">
-                <a14:hiddenLine xmlns:a14="http://schemas.microsoft.com/office/drawing/2010/main" xmlns="" w="9525">
+                <a14:hiddenLine xmlns="" xmlns:a14="http://schemas.microsoft.com/office/drawing/2010/main" w="9525">
                   <a:solidFill>
                     <a:srgbClr val="000000"/>
                   </a:solidFill>
@@ -1712,7 +1712,7 @@
             </a:ln>
             <a:extLst>
               <a:ext uri="{91240B29-F687-4f45-9708-019B960494DF}">
-                <a14:hiddenLine xmlns:a14="http://schemas.microsoft.com/office/drawing/2010/main" xmlns="" w="9525">
+                <a14:hiddenLine xmlns="" xmlns:a14="http://schemas.microsoft.com/office/drawing/2010/main" w="9525">
                   <a:solidFill>
                     <a:srgbClr val="000000"/>
                   </a:solidFill>
@@ -1768,7 +1768,7 @@
             </a:ln>
             <a:extLst>
               <a:ext uri="{91240B29-F687-4f45-9708-019B960494DF}">
-                <a14:hiddenLine xmlns:a14="http://schemas.microsoft.com/office/drawing/2010/main" xmlns="" w="9525">
+                <a14:hiddenLine xmlns="" xmlns:a14="http://schemas.microsoft.com/office/drawing/2010/main" w="9525">
                   <a:solidFill>
                     <a:srgbClr val="000000"/>
                   </a:solidFill>
@@ -1858,7 +1858,7 @@
             </a:ln>
             <a:extLst>
               <a:ext uri="{91240B29-F687-4f45-9708-019B960494DF}">
-                <a14:hiddenLine xmlns:a14="http://schemas.microsoft.com/office/drawing/2010/main" xmlns="" w="9525">
+                <a14:hiddenLine xmlns="" xmlns:a14="http://schemas.microsoft.com/office/drawing/2010/main" w="9525">
                   <a:solidFill>
                     <a:srgbClr val="000000"/>
                   </a:solidFill>
@@ -1914,7 +1914,7 @@
             </a:ln>
             <a:extLst>
               <a:ext uri="{91240B29-F687-4f45-9708-019B960494DF}">
-                <a14:hiddenLine xmlns:a14="http://schemas.microsoft.com/office/drawing/2010/main" xmlns="" w="9525">
+                <a14:hiddenLine xmlns="" xmlns:a14="http://schemas.microsoft.com/office/drawing/2010/main" w="9525">
                   <a:solidFill>
                     <a:srgbClr val="000000"/>
                   </a:solidFill>
@@ -2004,7 +2004,7 @@
             </a:ln>
             <a:extLst>
               <a:ext uri="{91240B29-F687-4f45-9708-019B960494DF}">
-                <a14:hiddenLine xmlns:a14="http://schemas.microsoft.com/office/drawing/2010/main" xmlns="" w="9525">
+                <a14:hiddenLine xmlns="" xmlns:a14="http://schemas.microsoft.com/office/drawing/2010/main" w="9525">
                   <a:solidFill>
                     <a:srgbClr val="000000"/>
                   </a:solidFill>
@@ -2072,7 +2072,7 @@
             </a:ln>
             <a:extLst>
               <a:ext uri="{91240B29-F687-4f45-9708-019B960494DF}">
-                <a14:hiddenLine xmlns:a14="http://schemas.microsoft.com/office/drawing/2010/main" xmlns="" w="9525">
+                <a14:hiddenLine xmlns="" xmlns:a14="http://schemas.microsoft.com/office/drawing/2010/main" w="9525">
                   <a:solidFill>
                     <a:srgbClr val="000000"/>
                   </a:solidFill>
@@ -2162,7 +2162,7 @@
             </a:ln>
             <a:extLst>
               <a:ext uri="{91240B29-F687-4f45-9708-019B960494DF}">
-                <a14:hiddenLine xmlns:a14="http://schemas.microsoft.com/office/drawing/2010/main" xmlns="" w="9525">
+                <a14:hiddenLine xmlns="" xmlns:a14="http://schemas.microsoft.com/office/drawing/2010/main" w="9525">
                   <a:solidFill>
                     <a:srgbClr val="000000"/>
                   </a:solidFill>
@@ -2230,7 +2230,7 @@
             </a:ln>
             <a:extLst>
               <a:ext uri="{91240B29-F687-4f45-9708-019B960494DF}">
-                <a14:hiddenLine xmlns:a14="http://schemas.microsoft.com/office/drawing/2010/main" xmlns="" w="9525">
+                <a14:hiddenLine xmlns="" xmlns:a14="http://schemas.microsoft.com/office/drawing/2010/main" w="9525">
                   <a:solidFill>
                     <a:srgbClr val="000000"/>
                   </a:solidFill>
@@ -2320,7 +2320,7 @@
             </a:ln>
             <a:extLst>
               <a:ext uri="{91240B29-F687-4f45-9708-019B960494DF}">
-                <a14:hiddenLine xmlns:a14="http://schemas.microsoft.com/office/drawing/2010/main" xmlns="" w="9525">
+                <a14:hiddenLine xmlns="" xmlns:a14="http://schemas.microsoft.com/office/drawing/2010/main" w="9525">
                   <a:solidFill>
                     <a:srgbClr val="000000"/>
                   </a:solidFill>
@@ -2354,7 +2354,7 @@
             </a:ln>
             <a:extLst>
               <a:ext uri="{91240B29-F687-4f45-9708-019B960494DF}">
-                <a14:hiddenLine xmlns:a14="http://schemas.microsoft.com/office/drawing/2010/main" xmlns="" w="9525">
+                <a14:hiddenLine xmlns="" xmlns:a14="http://schemas.microsoft.com/office/drawing/2010/main" w="9525">
                   <a:solidFill>
                     <a:srgbClr val="000000"/>
                   </a:solidFill>
@@ -2444,7 +2444,7 @@
             </a:ln>
             <a:extLst>
               <a:ext uri="{91240B29-F687-4f45-9708-019B960494DF}">
-                <a14:hiddenLine xmlns:a14="http://schemas.microsoft.com/office/drawing/2010/main" xmlns="" w="9525">
+                <a14:hiddenLine xmlns="" xmlns:a14="http://schemas.microsoft.com/office/drawing/2010/main" w="9525">
                   <a:solidFill>
                     <a:srgbClr val="000000"/>
                   </a:solidFill>
@@ -2506,7 +2506,7 @@
             </a:ln>
             <a:extLst>
               <a:ext uri="{91240B29-F687-4f45-9708-019B960494DF}">
-                <a14:hiddenLine xmlns:a14="http://schemas.microsoft.com/office/drawing/2010/main" xmlns="" w="9525">
+                <a14:hiddenLine xmlns="" xmlns:a14="http://schemas.microsoft.com/office/drawing/2010/main" w="9525">
                   <a:solidFill>
                     <a:srgbClr val="000000"/>
                   </a:solidFill>
@@ -2568,7 +2568,7 @@
             </a:ln>
             <a:extLst>
               <a:ext uri="{91240B29-F687-4f45-9708-019B960494DF}">
-                <a14:hiddenLine xmlns:a14="http://schemas.microsoft.com/office/drawing/2010/main" xmlns="" w="9525">
+                <a14:hiddenLine xmlns="" xmlns:a14="http://schemas.microsoft.com/office/drawing/2010/main" w="9525">
                   <a:solidFill>
                     <a:srgbClr val="000000"/>
                   </a:solidFill>
@@ -2658,7 +2658,7 @@
             </a:ln>
             <a:extLst>
               <a:ext uri="{91240B29-F687-4f45-9708-019B960494DF}">
-                <a14:hiddenLine xmlns:a14="http://schemas.microsoft.com/office/drawing/2010/main" xmlns="" w="9525">
+                <a14:hiddenLine xmlns="" xmlns:a14="http://schemas.microsoft.com/office/drawing/2010/main" w="9525">
                   <a:solidFill>
                     <a:srgbClr val="000000"/>
                   </a:solidFill>
@@ -2726,7 +2726,7 @@
             </a:ln>
             <a:extLst>
               <a:ext uri="{91240B29-F687-4f45-9708-019B960494DF}">
-                <a14:hiddenLine xmlns:a14="http://schemas.microsoft.com/office/drawing/2010/main" xmlns="" w="9525">
+                <a14:hiddenLine xmlns="" xmlns:a14="http://schemas.microsoft.com/office/drawing/2010/main" w="9525">
                   <a:solidFill>
                     <a:srgbClr val="000000"/>
                   </a:solidFill>
@@ -2788,7 +2788,7 @@
             </a:ln>
             <a:extLst>
               <a:ext uri="{91240B29-F687-4f45-9708-019B960494DF}">
-                <a14:hiddenLine xmlns:a14="http://schemas.microsoft.com/office/drawing/2010/main" xmlns="" w="9525">
+                <a14:hiddenLine xmlns="" xmlns:a14="http://schemas.microsoft.com/office/drawing/2010/main" w="9525">
                   <a:solidFill>
                     <a:srgbClr val="000000"/>
                   </a:solidFill>
@@ -2878,7 +2878,7 @@
             </a:ln>
             <a:extLst>
               <a:ext uri="{91240B29-F687-4f45-9708-019B960494DF}">
-                <a14:hiddenLine xmlns:a14="http://schemas.microsoft.com/office/drawing/2010/main" xmlns="" w="9525">
+                <a14:hiddenLine xmlns="" xmlns:a14="http://schemas.microsoft.com/office/drawing/2010/main" w="9525">
                   <a:solidFill>
                     <a:srgbClr val="000000"/>
                   </a:solidFill>
@@ -2940,7 +2940,7 @@
             </a:ln>
             <a:extLst>
               <a:ext uri="{91240B29-F687-4f45-9708-019B960494DF}">
-                <a14:hiddenLine xmlns:a14="http://schemas.microsoft.com/office/drawing/2010/main" xmlns="" w="9525">
+                <a14:hiddenLine xmlns="" xmlns:a14="http://schemas.microsoft.com/office/drawing/2010/main" w="9525">
                   <a:solidFill>
                     <a:srgbClr val="000000"/>
                   </a:solidFill>
@@ -3030,7 +3030,7 @@
             </a:ln>
             <a:extLst>
               <a:ext uri="{91240B29-F687-4f45-9708-019B960494DF}">
-                <a14:hiddenLine xmlns:a14="http://schemas.microsoft.com/office/drawing/2010/main" xmlns="" w="9525">
+                <a14:hiddenLine xmlns="" xmlns:a14="http://schemas.microsoft.com/office/drawing/2010/main" w="9525">
                   <a:solidFill>
                     <a:srgbClr val="000000"/>
                   </a:solidFill>
@@ -3092,7 +3092,7 @@
             </a:ln>
             <a:extLst>
               <a:ext uri="{91240B29-F687-4f45-9708-019B960494DF}">
-                <a14:hiddenLine xmlns:a14="http://schemas.microsoft.com/office/drawing/2010/main" xmlns="" w="9525">
+                <a14:hiddenLine xmlns="" xmlns:a14="http://schemas.microsoft.com/office/drawing/2010/main" w="9525">
                   <a:solidFill>
                     <a:srgbClr val="000000"/>
                   </a:solidFill>
@@ -3182,7 +3182,7 @@
             </a:ln>
             <a:extLst>
               <a:ext uri="{91240B29-F687-4f45-9708-019B960494DF}">
-                <a14:hiddenLine xmlns:a14="http://schemas.microsoft.com/office/drawing/2010/main" xmlns="" w="9525">
+                <a14:hiddenLine xmlns="" xmlns:a14="http://schemas.microsoft.com/office/drawing/2010/main" w="9525">
                   <a:solidFill>
                     <a:srgbClr val="000000"/>
                   </a:solidFill>
@@ -3216,7 +3216,7 @@
             </a:ln>
             <a:extLst>
               <a:ext uri="{91240B29-F687-4f45-9708-019B960494DF}">
-                <a14:hiddenLine xmlns:a14="http://schemas.microsoft.com/office/drawing/2010/main" xmlns="" w="9525">
+                <a14:hiddenLine xmlns="" xmlns:a14="http://schemas.microsoft.com/office/drawing/2010/main" w="9525">
                   <a:solidFill>
                     <a:srgbClr val="000000"/>
                   </a:solidFill>
@@ -3281,7 +3281,7 @@
             </a:ln>
             <a:extLst>
               <a:ext uri="{91240B29-F687-4f45-9708-019B960494DF}">
-                <a14:hiddenLine xmlns:a14="http://schemas.microsoft.com/office/drawing/2010/main" xmlns="" w="9525">
+                <a14:hiddenLine xmlns="" xmlns:a14="http://schemas.microsoft.com/office/drawing/2010/main" w="9525">
                   <a:solidFill>
                     <a:srgbClr val="000000"/>
                   </a:solidFill>
@@ -3371,7 +3371,7 @@
             </a:ln>
             <a:extLst>
               <a:ext uri="{91240B29-F687-4f45-9708-019B960494DF}">
-                <a14:hiddenLine xmlns:a14="http://schemas.microsoft.com/office/drawing/2010/main" xmlns="" w="9525">
+                <a14:hiddenLine xmlns="" xmlns:a14="http://schemas.microsoft.com/office/drawing/2010/main" w="9525">
                   <a:solidFill>
                     <a:srgbClr val="000000"/>
                   </a:solidFill>
@@ -3433,7 +3433,7 @@
             </a:ln>
             <a:extLst>
               <a:ext uri="{91240B29-F687-4f45-9708-019B960494DF}">
-                <a14:hiddenLine xmlns:a14="http://schemas.microsoft.com/office/drawing/2010/main" xmlns="" w="9525">
+                <a14:hiddenLine xmlns="" xmlns:a14="http://schemas.microsoft.com/office/drawing/2010/main" w="9525">
                   <a:solidFill>
                     <a:srgbClr val="000000"/>
                   </a:solidFill>
@@ -3523,7 +3523,7 @@
             </a:ln>
             <a:extLst>
               <a:ext uri="{91240B29-F687-4f45-9708-019B960494DF}">
-                <a14:hiddenLine xmlns:a14="http://schemas.microsoft.com/office/drawing/2010/main" xmlns="" w="9525">
+                <a14:hiddenLine xmlns="" xmlns:a14="http://schemas.microsoft.com/office/drawing/2010/main" w="9525">
                   <a:solidFill>
                     <a:srgbClr val="000000"/>
                   </a:solidFill>
@@ -3613,7 +3613,7 @@
             </a:ln>
             <a:extLst>
               <a:ext uri="{91240B29-F687-4f45-9708-019B960494DF}">
-                <a14:hiddenLine xmlns:a14="http://schemas.microsoft.com/office/drawing/2010/main" xmlns="" w="9525">
+                <a14:hiddenLine xmlns="" xmlns:a14="http://schemas.microsoft.com/office/drawing/2010/main" w="9525">
                   <a:solidFill>
                     <a:srgbClr val="000000"/>
                   </a:solidFill>
@@ -3678,7 +3678,7 @@
             </a:ln>
             <a:extLst>
               <a:ext uri="{91240B29-F687-4f45-9708-019B960494DF}">
-                <a14:hiddenLine xmlns:a14="http://schemas.microsoft.com/office/drawing/2010/main" xmlns="" w="9525">
+                <a14:hiddenLine xmlns="" xmlns:a14="http://schemas.microsoft.com/office/drawing/2010/main" w="9525">
                   <a:solidFill>
                     <a:srgbClr val="000000"/>
                   </a:solidFill>
@@ -3740,7 +3740,7 @@
             </a:ln>
             <a:extLst>
               <a:ext uri="{91240B29-F687-4f45-9708-019B960494DF}">
-                <a14:hiddenLine xmlns:a14="http://schemas.microsoft.com/office/drawing/2010/main" xmlns="" w="9525">
+                <a14:hiddenLine xmlns="" xmlns:a14="http://schemas.microsoft.com/office/drawing/2010/main" w="9525">
                   <a:solidFill>
                     <a:srgbClr val="000000"/>
                   </a:solidFill>
@@ -3830,7 +3830,7 @@
             </a:ln>
             <a:extLst>
               <a:ext uri="{91240B29-F687-4f45-9708-019B960494DF}">
-                <a14:hiddenLine xmlns:a14="http://schemas.microsoft.com/office/drawing/2010/main" xmlns="" w="9525">
+                <a14:hiddenLine xmlns="" xmlns:a14="http://schemas.microsoft.com/office/drawing/2010/main" w="9525">
                   <a:solidFill>
                     <a:srgbClr val="000000"/>
                   </a:solidFill>
@@ -3920,7 +3920,7 @@
             </a:ln>
             <a:extLst>
               <a:ext uri="{91240B29-F687-4f45-9708-019B960494DF}">
-                <a14:hiddenLine xmlns:a14="http://schemas.microsoft.com/office/drawing/2010/main" xmlns="" w="9525">
+                <a14:hiddenLine xmlns="" xmlns:a14="http://schemas.microsoft.com/office/drawing/2010/main" w="9525">
                   <a:solidFill>
                     <a:srgbClr val="000000"/>
                   </a:solidFill>
@@ -3982,7 +3982,7 @@
             </a:ln>
             <a:extLst>
               <a:ext uri="{91240B29-F687-4f45-9708-019B960494DF}">
-                <a14:hiddenLine xmlns:a14="http://schemas.microsoft.com/office/drawing/2010/main" xmlns="" w="9525">
+                <a14:hiddenLine xmlns="" xmlns:a14="http://schemas.microsoft.com/office/drawing/2010/main" w="9525">
                   <a:solidFill>
                     <a:srgbClr val="000000"/>
                   </a:solidFill>
@@ -4102,7 +4102,7 @@
             </a:ln>
             <a:extLst>
               <a:ext uri="{91240B29-F687-4f45-9708-019B960494DF}">
-                <a14:hiddenLine xmlns:a14="http://schemas.microsoft.com/office/drawing/2010/main" xmlns="" w="9525">
+                <a14:hiddenLine xmlns="" xmlns:a14="http://schemas.microsoft.com/office/drawing/2010/main" w="9525">
                   <a:solidFill>
                     <a:srgbClr val="000000"/>
                   </a:solidFill>
@@ -4170,7 +4170,7 @@
             </a:ln>
             <a:extLst>
               <a:ext uri="{91240B29-F687-4f45-9708-019B960494DF}">
-                <a14:hiddenLine xmlns:a14="http://schemas.microsoft.com/office/drawing/2010/main" xmlns="" w="9525">
+                <a14:hiddenLine xmlns="" xmlns:a14="http://schemas.microsoft.com/office/drawing/2010/main" w="9525">
                   <a:solidFill>
                     <a:srgbClr val="000000"/>
                   </a:solidFill>
@@ -4260,7 +4260,7 @@
             </a:ln>
             <a:extLst>
               <a:ext uri="{91240B29-F687-4f45-9708-019B960494DF}">
-                <a14:hiddenLine xmlns:a14="http://schemas.microsoft.com/office/drawing/2010/main" xmlns="" w="9525">
+                <a14:hiddenLine xmlns="" xmlns:a14="http://schemas.microsoft.com/office/drawing/2010/main" w="9525">
                   <a:solidFill>
                     <a:srgbClr val="000000"/>
                   </a:solidFill>
@@ -4300,7 +4300,7 @@
           </a:lstStyle>
           <a:p>
             <a:r>
-              <a:rPr lang="en-US" smtClean="0"/>
+              <a:rPr lang="en-US"/>
               <a:t>Click to edit Master title style</a:t>
             </a:r>
             <a:endParaRPr lang="en-US" dirty="0"/>
@@ -4371,7 +4371,7 @@
           </a:lstStyle>
           <a:p>
             <a:r>
-              <a:rPr lang="en-US" smtClean="0"/>
+              <a:rPr lang="en-US"/>
               <a:t>Click to edit Master subtitle style</a:t>
             </a:r>
             <a:endParaRPr lang="en-US" dirty="0"/>
@@ -4510,7 +4510,7 @@
           </a:lstStyle>
           <a:p>
             <a:r>
-              <a:rPr lang="en-US" smtClean="0"/>
+              <a:rPr lang="en-US"/>
               <a:t>Click to edit Master title style</a:t>
             </a:r>
             <a:endParaRPr lang="en-US" dirty="0"/>
@@ -4571,7 +4571,7 @@
               <a:buNone/>
             </a:pPr>
             <a:r>
-              <a:rPr lang="en-US" smtClean="0"/>
+              <a:rPr lang="en-US"/>
               <a:t>Drag picture to placeholder or click icon to add</a:t>
             </a:r>
             <a:endParaRPr lang="en-US" dirty="0"/>
@@ -4639,7 +4639,7 @@
           <a:p>
             <a:pPr lvl="0"/>
             <a:r>
-              <a:rPr lang="en-US" smtClean="0"/>
+              <a:rPr lang="en-US"/>
               <a:t>Click to edit Master text styles</a:t>
             </a:r>
           </a:p>
@@ -4762,7 +4762,7 @@
           </a:lstStyle>
           <a:p>
             <a:r>
-              <a:rPr lang="en-US" smtClean="0"/>
+              <a:rPr lang="en-US"/>
               <a:t>Click to edit Master title style</a:t>
             </a:r>
             <a:endParaRPr lang="en-US" dirty="0"/>
@@ -4830,7 +4830,7 @@
           <a:p>
             <a:pPr lvl="0"/>
             <a:r>
-              <a:rPr lang="en-US" smtClean="0"/>
+              <a:rPr lang="en-US"/>
               <a:t>Click to edit Master text styles</a:t>
             </a:r>
           </a:p>
@@ -4953,7 +4953,7 @@
           </a:lstStyle>
           <a:p>
             <a:r>
-              <a:rPr lang="en-US" smtClean="0"/>
+              <a:rPr lang="en-US"/>
               <a:t>Click to edit Master title style</a:t>
             </a:r>
             <a:endParaRPr lang="en-US" dirty="0"/>
@@ -5021,7 +5021,7 @@
           <a:p>
             <a:pPr lvl="0"/>
             <a:r>
-              <a:rPr lang="en-US" smtClean="0"/>
+              <a:rPr lang="en-US"/>
               <a:t>Click to edit Master text styles</a:t>
             </a:r>
           </a:p>
@@ -5088,7 +5088,7 @@
           <a:p>
             <a:pPr lvl="0"/>
             <a:r>
-              <a:rPr lang="en-US" smtClean="0"/>
+              <a:rPr lang="en-US"/>
               <a:t>Click to edit Master text styles</a:t>
             </a:r>
           </a:p>
@@ -5449,7 +5449,7 @@
           </a:lstStyle>
           <a:p>
             <a:r>
-              <a:rPr lang="en-US" smtClean="0"/>
+              <a:rPr lang="en-US"/>
               <a:t>Click to edit Master title style</a:t>
             </a:r>
             <a:endParaRPr lang="en-US" dirty="0"/>
@@ -5517,7 +5517,7 @@
           <a:p>
             <a:pPr lvl="0"/>
             <a:r>
-              <a:rPr lang="en-US" smtClean="0"/>
+              <a:rPr lang="en-US"/>
               <a:t>Click to edit Master text styles</a:t>
             </a:r>
           </a:p>
@@ -5634,7 +5634,7 @@
           <a:lstStyle/>
           <a:p>
             <a:r>
-              <a:rPr lang="en-US" smtClean="0"/>
+              <a:rPr lang="en-US"/>
               <a:t>Click to edit Master title style</a:t>
             </a:r>
             <a:endParaRPr lang="en-US" dirty="0"/>
@@ -5709,7 +5709,7 @@
           <a:p>
             <a:pPr lvl="0"/>
             <a:r>
-              <a:rPr lang="en-US" smtClean="0"/>
+              <a:rPr lang="en-US"/>
               <a:t>Click to edit Master text styles</a:t>
             </a:r>
           </a:p>
@@ -5776,7 +5776,7 @@
           <a:p>
             <a:pPr lvl="0"/>
             <a:r>
-              <a:rPr lang="en-US" smtClean="0"/>
+              <a:rPr lang="en-US"/>
               <a:t>Click to edit Master text styles</a:t>
             </a:r>
           </a:p>
@@ -5850,7 +5850,7 @@
           <a:p>
             <a:pPr lvl="0"/>
             <a:r>
-              <a:rPr lang="en-US" smtClean="0"/>
+              <a:rPr lang="en-US"/>
               <a:t>Click to edit Master text styles</a:t>
             </a:r>
           </a:p>
@@ -5917,7 +5917,7 @@
           <a:p>
             <a:pPr lvl="0"/>
             <a:r>
-              <a:rPr lang="en-US" smtClean="0"/>
+              <a:rPr lang="en-US"/>
               <a:t>Click to edit Master text styles</a:t>
             </a:r>
           </a:p>
@@ -5991,7 +5991,7 @@
           <a:p>
             <a:pPr lvl="0"/>
             <a:r>
-              <a:rPr lang="en-US" smtClean="0"/>
+              <a:rPr lang="en-US"/>
               <a:t>Click to edit Master text styles</a:t>
             </a:r>
           </a:p>
@@ -6058,7 +6058,7 @@
           <a:p>
             <a:pPr lvl="0"/>
             <a:r>
-              <a:rPr lang="en-US" smtClean="0"/>
+              <a:rPr lang="en-US"/>
               <a:t>Click to edit Master text styles</a:t>
             </a:r>
           </a:p>
@@ -6175,7 +6175,7 @@
           <a:lstStyle/>
           <a:p>
             <a:r>
-              <a:rPr lang="en-US" smtClean="0"/>
+              <a:rPr lang="en-US"/>
               <a:t>Click to edit Master title style</a:t>
             </a:r>
             <a:endParaRPr lang="en-US" dirty="0"/>
@@ -6250,7 +6250,7 @@
           <a:p>
             <a:pPr lvl="0"/>
             <a:r>
-              <a:rPr lang="en-US" smtClean="0"/>
+              <a:rPr lang="en-US"/>
               <a:t>Click to edit Master text styles</a:t>
             </a:r>
           </a:p>
@@ -6307,7 +6307,7 @@
               <a:buNone/>
             </a:pPr>
             <a:r>
-              <a:rPr lang="en-US" smtClean="0"/>
+              <a:rPr lang="en-US"/>
               <a:t>Drag picture to placeholder or click icon to add</a:t>
             </a:r>
             <a:endParaRPr lang="en-US" dirty="0"/>
@@ -6375,7 +6375,7 @@
           <a:p>
             <a:pPr lvl="0"/>
             <a:r>
-              <a:rPr lang="en-US" smtClean="0"/>
+              <a:rPr lang="en-US"/>
               <a:t>Click to edit Master text styles</a:t>
             </a:r>
           </a:p>
@@ -6449,7 +6449,7 @@
           <a:p>
             <a:pPr lvl="0"/>
             <a:r>
-              <a:rPr lang="en-US" smtClean="0"/>
+              <a:rPr lang="en-US"/>
               <a:t>Click to edit Master text styles</a:t>
             </a:r>
           </a:p>
@@ -6506,7 +6506,7 @@
               <a:buNone/>
             </a:pPr>
             <a:r>
-              <a:rPr lang="en-US" smtClean="0"/>
+              <a:rPr lang="en-US"/>
               <a:t>Drag picture to placeholder or click icon to add</a:t>
             </a:r>
             <a:endParaRPr lang="en-US" dirty="0"/>
@@ -6574,7 +6574,7 @@
           <a:p>
             <a:pPr lvl="0"/>
             <a:r>
-              <a:rPr lang="en-US" smtClean="0"/>
+              <a:rPr lang="en-US"/>
               <a:t>Click to edit Master text styles</a:t>
             </a:r>
           </a:p>
@@ -6648,7 +6648,7 @@
           <a:p>
             <a:pPr lvl="0"/>
             <a:r>
-              <a:rPr lang="en-US" smtClean="0"/>
+              <a:rPr lang="en-US"/>
               <a:t>Click to edit Master text styles</a:t>
             </a:r>
           </a:p>
@@ -6705,7 +6705,7 @@
               <a:buNone/>
             </a:pPr>
             <a:r>
-              <a:rPr lang="en-US" smtClean="0"/>
+              <a:rPr lang="en-US"/>
               <a:t>Drag picture to placeholder or click icon to add</a:t>
             </a:r>
             <a:endParaRPr lang="en-US" dirty="0"/>
@@ -6773,7 +6773,7 @@
           <a:p>
             <a:pPr lvl="0"/>
             <a:r>
-              <a:rPr lang="en-US" smtClean="0"/>
+              <a:rPr lang="en-US"/>
               <a:t>Click to edit Master text styles</a:t>
             </a:r>
           </a:p>
@@ -6885,7 +6885,7 @@
           <a:lstStyle/>
           <a:p>
             <a:r>
-              <a:rPr lang="en-US" smtClean="0"/>
+              <a:rPr lang="en-US"/>
               <a:t>Click to edit Master title style</a:t>
             </a:r>
             <a:endParaRPr lang="en-US" dirty="0"/>
@@ -6909,35 +6909,35 @@
           <a:p>
             <a:pPr lvl="0"/>
             <a:r>
-              <a:rPr lang="en-US" smtClean="0"/>
+              <a:rPr lang="en-US"/>
               <a:t>Click to edit Master text styles</a:t>
             </a:r>
           </a:p>
           <a:p>
             <a:pPr lvl="1"/>
             <a:r>
-              <a:rPr lang="en-US" smtClean="0"/>
+              <a:rPr lang="en-US"/>
               <a:t>Second level</a:t>
             </a:r>
           </a:p>
           <a:p>
             <a:pPr lvl="2"/>
             <a:r>
-              <a:rPr lang="en-US" smtClean="0"/>
+              <a:rPr lang="en-US"/>
               <a:t>Third level</a:t>
             </a:r>
           </a:p>
           <a:p>
             <a:pPr lvl="3"/>
             <a:r>
-              <a:rPr lang="en-US" smtClean="0"/>
+              <a:rPr lang="en-US"/>
               <a:t>Fourth level</a:t>
             </a:r>
           </a:p>
           <a:p>
             <a:pPr lvl="4"/>
             <a:r>
-              <a:rPr lang="en-US" smtClean="0"/>
+              <a:rPr lang="en-US"/>
               <a:t>Fifth level</a:t>
             </a:r>
             <a:endParaRPr lang="en-US" dirty="0"/>
@@ -7055,7 +7055,7 @@
           <a:lstStyle/>
           <a:p>
             <a:r>
-              <a:rPr lang="en-US" smtClean="0"/>
+              <a:rPr lang="en-US"/>
               <a:t>Click to edit Master title style</a:t>
             </a:r>
             <a:endParaRPr lang="en-US" dirty="0"/>
@@ -7084,35 +7084,35 @@
           <a:p>
             <a:pPr lvl="0"/>
             <a:r>
-              <a:rPr lang="en-US" smtClean="0"/>
+              <a:rPr lang="en-US"/>
               <a:t>Click to edit Master text styles</a:t>
             </a:r>
           </a:p>
           <a:p>
             <a:pPr lvl="1"/>
             <a:r>
-              <a:rPr lang="en-US" smtClean="0"/>
+              <a:rPr lang="en-US"/>
               <a:t>Second level</a:t>
             </a:r>
           </a:p>
           <a:p>
             <a:pPr lvl="2"/>
             <a:r>
-              <a:rPr lang="en-US" smtClean="0"/>
+              <a:rPr lang="en-US"/>
               <a:t>Third level</a:t>
             </a:r>
           </a:p>
           <a:p>
             <a:pPr lvl="3"/>
             <a:r>
-              <a:rPr lang="en-US" smtClean="0"/>
+              <a:rPr lang="en-US"/>
               <a:t>Fourth level</a:t>
             </a:r>
           </a:p>
           <a:p>
             <a:pPr lvl="4"/>
             <a:r>
-              <a:rPr lang="en-US" smtClean="0"/>
+              <a:rPr lang="en-US"/>
               <a:t>Fifth level</a:t>
             </a:r>
             <a:endParaRPr lang="en-US" dirty="0"/>
@@ -7225,7 +7225,7 @@
           <a:lstStyle/>
           <a:p>
             <a:r>
-              <a:rPr lang="en-US" smtClean="0"/>
+              <a:rPr lang="en-US"/>
               <a:t>Click to edit Master title style</a:t>
             </a:r>
             <a:endParaRPr lang="en-US" dirty="0"/>
@@ -7249,35 +7249,35 @@
           <a:p>
             <a:pPr lvl="0"/>
             <a:r>
-              <a:rPr lang="en-US" smtClean="0"/>
+              <a:rPr lang="en-US"/>
               <a:t>Click to edit Master text styles</a:t>
             </a:r>
           </a:p>
           <a:p>
             <a:pPr lvl="1"/>
             <a:r>
-              <a:rPr lang="en-US" smtClean="0"/>
+              <a:rPr lang="en-US"/>
               <a:t>Second level</a:t>
             </a:r>
           </a:p>
           <a:p>
             <a:pPr lvl="2"/>
             <a:r>
-              <a:rPr lang="en-US" smtClean="0"/>
+              <a:rPr lang="en-US"/>
               <a:t>Third level</a:t>
             </a:r>
           </a:p>
           <a:p>
             <a:pPr lvl="3"/>
             <a:r>
-              <a:rPr lang="en-US" smtClean="0"/>
+              <a:rPr lang="en-US"/>
               <a:t>Fourth level</a:t>
             </a:r>
           </a:p>
           <a:p>
             <a:pPr lvl="4"/>
             <a:r>
-              <a:rPr lang="en-US" smtClean="0"/>
+              <a:rPr lang="en-US"/>
               <a:t>Fifth level</a:t>
             </a:r>
             <a:endParaRPr lang="en-US" dirty="0"/>
@@ -7401,7 +7401,7 @@
           </a:lstStyle>
           <a:p>
             <a:r>
-              <a:rPr lang="en-US" smtClean="0"/>
+              <a:rPr lang="en-US"/>
               <a:t>Click to edit Master title style</a:t>
             </a:r>
             <a:endParaRPr lang="en-US" dirty="0"/>
@@ -7523,7 +7523,7 @@
           <a:p>
             <a:pPr lvl="0"/>
             <a:r>
-              <a:rPr lang="en-US" smtClean="0"/>
+              <a:rPr lang="en-US"/>
               <a:t>Click to edit Master text styles</a:t>
             </a:r>
           </a:p>
@@ -7635,7 +7635,7 @@
           <a:lstStyle/>
           <a:p>
             <a:r>
-              <a:rPr lang="en-US" smtClean="0"/>
+              <a:rPr lang="en-US"/>
               <a:t>Click to edit Master title style</a:t>
             </a:r>
             <a:endParaRPr lang="en-US" dirty="0"/>
@@ -7664,35 +7664,35 @@
           <a:p>
             <a:pPr lvl="0"/>
             <a:r>
-              <a:rPr lang="en-US" smtClean="0"/>
+              <a:rPr lang="en-US"/>
               <a:t>Click to edit Master text styles</a:t>
             </a:r>
           </a:p>
           <a:p>
             <a:pPr lvl="1"/>
             <a:r>
-              <a:rPr lang="en-US" smtClean="0"/>
+              <a:rPr lang="en-US"/>
               <a:t>Second level</a:t>
             </a:r>
           </a:p>
           <a:p>
             <a:pPr lvl="2"/>
             <a:r>
-              <a:rPr lang="en-US" smtClean="0"/>
+              <a:rPr lang="en-US"/>
               <a:t>Third level</a:t>
             </a:r>
           </a:p>
           <a:p>
             <a:pPr lvl="3"/>
             <a:r>
-              <a:rPr lang="en-US" smtClean="0"/>
+              <a:rPr lang="en-US"/>
               <a:t>Fourth level</a:t>
             </a:r>
           </a:p>
           <a:p>
             <a:pPr lvl="4"/>
             <a:r>
-              <a:rPr lang="en-US" smtClean="0"/>
+              <a:rPr lang="en-US"/>
               <a:t>Fifth level</a:t>
             </a:r>
             <a:endParaRPr lang="en-US" dirty="0"/>
@@ -7721,35 +7721,35 @@
           <a:p>
             <a:pPr lvl="0"/>
             <a:r>
-              <a:rPr lang="en-US" smtClean="0"/>
+              <a:rPr lang="en-US"/>
               <a:t>Click to edit Master text styles</a:t>
             </a:r>
           </a:p>
           <a:p>
             <a:pPr lvl="1"/>
             <a:r>
-              <a:rPr lang="en-US" smtClean="0"/>
+              <a:rPr lang="en-US"/>
               <a:t>Second level</a:t>
             </a:r>
           </a:p>
           <a:p>
             <a:pPr lvl="2"/>
             <a:r>
-              <a:rPr lang="en-US" smtClean="0"/>
+              <a:rPr lang="en-US"/>
               <a:t>Third level</a:t>
             </a:r>
           </a:p>
           <a:p>
             <a:pPr lvl="3"/>
             <a:r>
-              <a:rPr lang="en-US" smtClean="0"/>
+              <a:rPr lang="en-US"/>
               <a:t>Fourth level</a:t>
             </a:r>
           </a:p>
           <a:p>
             <a:pPr lvl="4"/>
             <a:r>
-              <a:rPr lang="en-US" smtClean="0"/>
+              <a:rPr lang="en-US"/>
               <a:t>Fifth level</a:t>
             </a:r>
             <a:endParaRPr lang="en-US" dirty="0"/>
@@ -7867,7 +7867,7 @@
           <a:lstStyle/>
           <a:p>
             <a:r>
-              <a:rPr lang="en-US" smtClean="0"/>
+              <a:rPr lang="en-US"/>
               <a:t>Click to edit Master title style</a:t>
             </a:r>
             <a:endParaRPr lang="en-US" dirty="0"/>
@@ -7940,7 +7940,7 @@
           <a:p>
             <a:pPr lvl="0"/>
             <a:r>
-              <a:rPr lang="en-US" smtClean="0"/>
+              <a:rPr lang="en-US"/>
               <a:t>Click to edit Master text styles</a:t>
             </a:r>
           </a:p>
@@ -7968,35 +7968,35 @@
           <a:p>
             <a:pPr lvl="0"/>
             <a:r>
-              <a:rPr lang="en-US" smtClean="0"/>
+              <a:rPr lang="en-US"/>
               <a:t>Click to edit Master text styles</a:t>
             </a:r>
           </a:p>
           <a:p>
             <a:pPr lvl="1"/>
             <a:r>
-              <a:rPr lang="en-US" smtClean="0"/>
+              <a:rPr lang="en-US"/>
               <a:t>Second level</a:t>
             </a:r>
           </a:p>
           <a:p>
             <a:pPr lvl="2"/>
             <a:r>
-              <a:rPr lang="en-US" smtClean="0"/>
+              <a:rPr lang="en-US"/>
               <a:t>Third level</a:t>
             </a:r>
           </a:p>
           <a:p>
             <a:pPr lvl="3"/>
             <a:r>
-              <a:rPr lang="en-US" smtClean="0"/>
+              <a:rPr lang="en-US"/>
               <a:t>Fourth level</a:t>
             </a:r>
           </a:p>
           <a:p>
             <a:pPr lvl="4"/>
             <a:r>
-              <a:rPr lang="en-US" smtClean="0"/>
+              <a:rPr lang="en-US"/>
               <a:t>Fifth level</a:t>
             </a:r>
             <a:endParaRPr lang="en-US" dirty="0"/>
@@ -8069,7 +8069,7 @@
           <a:p>
             <a:pPr lvl="0"/>
             <a:r>
-              <a:rPr lang="en-US" smtClean="0"/>
+              <a:rPr lang="en-US"/>
               <a:t>Click to edit Master text styles</a:t>
             </a:r>
           </a:p>
@@ -8097,35 +8097,35 @@
           <a:p>
             <a:pPr lvl="0"/>
             <a:r>
-              <a:rPr lang="en-US" smtClean="0"/>
+              <a:rPr lang="en-US"/>
               <a:t>Click to edit Master text styles</a:t>
             </a:r>
           </a:p>
           <a:p>
             <a:pPr lvl="1"/>
             <a:r>
-              <a:rPr lang="en-US" smtClean="0"/>
+              <a:rPr lang="en-US"/>
               <a:t>Second level</a:t>
             </a:r>
           </a:p>
           <a:p>
             <a:pPr lvl="2"/>
             <a:r>
-              <a:rPr lang="en-US" smtClean="0"/>
+              <a:rPr lang="en-US"/>
               <a:t>Third level</a:t>
             </a:r>
           </a:p>
           <a:p>
             <a:pPr lvl="3"/>
             <a:r>
-              <a:rPr lang="en-US" smtClean="0"/>
+              <a:rPr lang="en-US"/>
               <a:t>Fourth level</a:t>
             </a:r>
           </a:p>
           <a:p>
             <a:pPr lvl="4"/>
             <a:r>
-              <a:rPr lang="en-US" smtClean="0"/>
+              <a:rPr lang="en-US"/>
               <a:t>Fifth level</a:t>
             </a:r>
             <a:endParaRPr lang="en-US" dirty="0"/>
@@ -8238,7 +8238,7 @@
           <a:lstStyle/>
           <a:p>
             <a:r>
-              <a:rPr lang="en-US" smtClean="0"/>
+              <a:rPr lang="en-US"/>
               <a:t>Click to edit Master title style</a:t>
             </a:r>
             <a:endParaRPr lang="en-US" dirty="0"/>
@@ -8450,7 +8450,7 @@
           </a:lstStyle>
           <a:p>
             <a:r>
-              <a:rPr lang="en-US" smtClean="0"/>
+              <a:rPr lang="en-US"/>
               <a:t>Click to edit Master title style</a:t>
             </a:r>
             <a:endParaRPr lang="en-US" dirty="0"/>
@@ -8479,35 +8479,35 @@
           <a:p>
             <a:pPr lvl="0"/>
             <a:r>
-              <a:rPr lang="en-US" smtClean="0"/>
+              <a:rPr lang="en-US"/>
               <a:t>Click to edit Master text styles</a:t>
             </a:r>
           </a:p>
           <a:p>
             <a:pPr lvl="1"/>
             <a:r>
-              <a:rPr lang="en-US" smtClean="0"/>
+              <a:rPr lang="en-US"/>
               <a:t>Second level</a:t>
             </a:r>
           </a:p>
           <a:p>
             <a:pPr lvl="2"/>
             <a:r>
-              <a:rPr lang="en-US" smtClean="0"/>
+              <a:rPr lang="en-US"/>
               <a:t>Third level</a:t>
             </a:r>
           </a:p>
           <a:p>
             <a:pPr lvl="3"/>
             <a:r>
-              <a:rPr lang="en-US" smtClean="0"/>
+              <a:rPr lang="en-US"/>
               <a:t>Fourth level</a:t>
             </a:r>
           </a:p>
           <a:p>
             <a:pPr lvl="4"/>
             <a:r>
-              <a:rPr lang="en-US" smtClean="0"/>
+              <a:rPr lang="en-US"/>
               <a:t>Fifth level</a:t>
             </a:r>
             <a:endParaRPr lang="en-US" dirty="0"/>
@@ -8573,7 +8573,7 @@
           <a:p>
             <a:pPr lvl="0"/>
             <a:r>
-              <a:rPr lang="en-US" smtClean="0"/>
+              <a:rPr lang="en-US"/>
               <a:t>Click to edit Master text styles</a:t>
             </a:r>
           </a:p>
@@ -8694,7 +8694,7 @@
           </a:lstStyle>
           <a:p>
             <a:r>
-              <a:rPr lang="en-US" smtClean="0"/>
+              <a:rPr lang="en-US"/>
               <a:t>Click to edit Master title style</a:t>
             </a:r>
             <a:endParaRPr lang="en-US" dirty="0"/>
@@ -8782,7 +8782,7 @@
           </a:lstStyle>
           <a:p>
             <a:r>
-              <a:rPr lang="en-US" smtClean="0"/>
+              <a:rPr lang="en-US"/>
               <a:t>Drag picture to placeholder or click icon to add</a:t>
             </a:r>
             <a:endParaRPr lang="en-US" dirty="0"/>
@@ -8848,7 +8848,7 @@
           <a:p>
             <a:pPr lvl="0"/>
             <a:r>
-              <a:rPr lang="en-US" smtClean="0"/>
+              <a:rPr lang="en-US"/>
               <a:t>Click to edit Master text styles</a:t>
             </a:r>
           </a:p>
@@ -8982,7 +8982,7 @@
           <a:noFill/>
           <a:extLst>
             <a:ext uri="{909E8E84-426E-40dd-AFC4-6F175D3DCCD1}">
-              <a14:hiddenFill xmlns:a14="http://schemas.microsoft.com/office/drawing/2010/main" xmlns="">
+              <a14:hiddenFill xmlns="" xmlns:a14="http://schemas.microsoft.com/office/drawing/2010/main">
                 <a:solidFill>
                   <a:srgbClr val="FFFFFF"/>
                 </a:solidFill>
@@ -9056,7 +9056,7 @@
               </a:ln>
               <a:extLst>
                 <a:ext uri="{91240B29-F687-4f45-9708-019B960494DF}">
-                  <a14:hiddenLine xmlns:a14="http://schemas.microsoft.com/office/drawing/2010/main" xmlns="" w="9525">
+                  <a14:hiddenLine xmlns="" xmlns:a14="http://schemas.microsoft.com/office/drawing/2010/main" w="9525">
                     <a:solidFill>
                       <a:srgbClr val="000000"/>
                     </a:solidFill>
@@ -9146,7 +9146,7 @@
               </a:ln>
               <a:extLst>
                 <a:ext uri="{91240B29-F687-4f45-9708-019B960494DF}">
-                  <a14:hiddenLine xmlns:a14="http://schemas.microsoft.com/office/drawing/2010/main" xmlns="" w="9525">
+                  <a14:hiddenLine xmlns="" xmlns:a14="http://schemas.microsoft.com/office/drawing/2010/main" w="9525">
                     <a:solidFill>
                       <a:srgbClr val="000000"/>
                     </a:solidFill>
@@ -9236,7 +9236,7 @@
               </a:ln>
               <a:extLst>
                 <a:ext uri="{91240B29-F687-4f45-9708-019B960494DF}">
-                  <a14:hiddenLine xmlns:a14="http://schemas.microsoft.com/office/drawing/2010/main" xmlns="" w="9525">
+                  <a14:hiddenLine xmlns="" xmlns:a14="http://schemas.microsoft.com/office/drawing/2010/main" w="9525">
                     <a:solidFill>
                       <a:srgbClr val="000000"/>
                     </a:solidFill>
@@ -9298,7 +9298,7 @@
               </a:ln>
               <a:extLst>
                 <a:ext uri="{91240B29-F687-4f45-9708-019B960494DF}">
-                  <a14:hiddenLine xmlns:a14="http://schemas.microsoft.com/office/drawing/2010/main" xmlns="" w="9525">
+                  <a14:hiddenLine xmlns="" xmlns:a14="http://schemas.microsoft.com/office/drawing/2010/main" w="9525">
                     <a:solidFill>
                       <a:srgbClr val="000000"/>
                     </a:solidFill>
@@ -9388,7 +9388,7 @@
               </a:ln>
               <a:extLst>
                 <a:ext uri="{91240B29-F687-4f45-9708-019B960494DF}">
-                  <a14:hiddenLine xmlns:a14="http://schemas.microsoft.com/office/drawing/2010/main" xmlns="" w="9525">
+                  <a14:hiddenLine xmlns="" xmlns:a14="http://schemas.microsoft.com/office/drawing/2010/main" w="9525">
                     <a:solidFill>
                       <a:srgbClr val="000000"/>
                     </a:solidFill>
@@ -9450,7 +9450,7 @@
               </a:ln>
               <a:extLst>
                 <a:ext uri="{91240B29-F687-4f45-9708-019B960494DF}">
-                  <a14:hiddenLine xmlns:a14="http://schemas.microsoft.com/office/drawing/2010/main" xmlns="" w="9525">
+                  <a14:hiddenLine xmlns="" xmlns:a14="http://schemas.microsoft.com/office/drawing/2010/main" w="9525">
                     <a:solidFill>
                       <a:srgbClr val="000000"/>
                     </a:solidFill>
@@ -9512,7 +9512,7 @@
               </a:ln>
               <a:extLst>
                 <a:ext uri="{91240B29-F687-4f45-9708-019B960494DF}">
-                  <a14:hiddenLine xmlns:a14="http://schemas.microsoft.com/office/drawing/2010/main" xmlns="" w="9525">
+                  <a14:hiddenLine xmlns="" xmlns:a14="http://schemas.microsoft.com/office/drawing/2010/main" w="9525">
                     <a:solidFill>
                       <a:srgbClr val="000000"/>
                     </a:solidFill>
@@ -9602,7 +9602,7 @@
               </a:ln>
               <a:extLst>
                 <a:ext uri="{91240B29-F687-4f45-9708-019B960494DF}">
-                  <a14:hiddenLine xmlns:a14="http://schemas.microsoft.com/office/drawing/2010/main" xmlns="" w="9525">
+                  <a14:hiddenLine xmlns="" xmlns:a14="http://schemas.microsoft.com/office/drawing/2010/main" w="9525">
                     <a:solidFill>
                       <a:srgbClr val="000000"/>
                     </a:solidFill>
@@ -9692,7 +9692,7 @@
               </a:ln>
               <a:extLst>
                 <a:ext uri="{91240B29-F687-4f45-9708-019B960494DF}">
-                  <a14:hiddenLine xmlns:a14="http://schemas.microsoft.com/office/drawing/2010/main" xmlns="" w="9525">
+                  <a14:hiddenLine xmlns="" xmlns:a14="http://schemas.microsoft.com/office/drawing/2010/main" w="9525">
                     <a:solidFill>
                       <a:srgbClr val="000000"/>
                     </a:solidFill>
@@ -9754,7 +9754,7 @@
               </a:ln>
               <a:extLst>
                 <a:ext uri="{91240B29-F687-4f45-9708-019B960494DF}">
-                  <a14:hiddenLine xmlns:a14="http://schemas.microsoft.com/office/drawing/2010/main" xmlns="" w="9525">
+                  <a14:hiddenLine xmlns="" xmlns:a14="http://schemas.microsoft.com/office/drawing/2010/main" w="9525">
                     <a:solidFill>
                       <a:srgbClr val="000000"/>
                     </a:solidFill>
@@ -9864,7 +9864,7 @@
               </a:ln>
               <a:extLst>
                 <a:ext uri="{91240B29-F687-4f45-9708-019B960494DF}">
-                  <a14:hiddenLine xmlns:a14="http://schemas.microsoft.com/office/drawing/2010/main" xmlns="" w="9525">
+                  <a14:hiddenLine xmlns="" xmlns:a14="http://schemas.microsoft.com/office/drawing/2010/main" w="9525">
                     <a:solidFill>
                       <a:srgbClr val="000000"/>
                     </a:solidFill>
@@ -9948,7 +9948,7 @@
               </a:ln>
               <a:extLst>
                 <a:ext uri="{91240B29-F687-4f45-9708-019B960494DF}">
-                  <a14:hiddenLine xmlns:a14="http://schemas.microsoft.com/office/drawing/2010/main" xmlns="" w="9525">
+                  <a14:hiddenLine xmlns="" xmlns:a14="http://schemas.microsoft.com/office/drawing/2010/main" w="9525">
                     <a:solidFill>
                       <a:srgbClr val="000000"/>
                     </a:solidFill>
@@ -10010,7 +10010,7 @@
               </a:ln>
               <a:extLst>
                 <a:ext uri="{91240B29-F687-4f45-9708-019B960494DF}">
-                  <a14:hiddenLine xmlns:a14="http://schemas.microsoft.com/office/drawing/2010/main" xmlns="" w="9525">
+                  <a14:hiddenLine xmlns="" xmlns:a14="http://schemas.microsoft.com/office/drawing/2010/main" w="9525">
                     <a:solidFill>
                       <a:srgbClr val="000000"/>
                     </a:solidFill>
@@ -10072,7 +10072,7 @@
               </a:ln>
               <a:extLst>
                 <a:ext uri="{91240B29-F687-4f45-9708-019B960494DF}">
-                  <a14:hiddenLine xmlns:a14="http://schemas.microsoft.com/office/drawing/2010/main" xmlns="" w="9525">
+                  <a14:hiddenLine xmlns="" xmlns:a14="http://schemas.microsoft.com/office/drawing/2010/main" w="9525">
                     <a:solidFill>
                       <a:srgbClr val="000000"/>
                     </a:solidFill>
@@ -10162,7 +10162,7 @@
               </a:ln>
               <a:extLst>
                 <a:ext uri="{91240B29-F687-4f45-9708-019B960494DF}">
-                  <a14:hiddenLine xmlns:a14="http://schemas.microsoft.com/office/drawing/2010/main" xmlns="" w="9525">
+                  <a14:hiddenLine xmlns="" xmlns:a14="http://schemas.microsoft.com/office/drawing/2010/main" w="9525">
                     <a:solidFill>
                       <a:srgbClr val="000000"/>
                     </a:solidFill>
@@ -10196,7 +10196,7 @@
               </a:ln>
               <a:extLst>
                 <a:ext uri="{91240B29-F687-4f45-9708-019B960494DF}">
-                  <a14:hiddenLine xmlns:a14="http://schemas.microsoft.com/office/drawing/2010/main" xmlns="" w="9525">
+                  <a14:hiddenLine xmlns="" xmlns:a14="http://schemas.microsoft.com/office/drawing/2010/main" w="9525">
                     <a:solidFill>
                       <a:srgbClr val="000000"/>
                     </a:solidFill>
@@ -10261,7 +10261,7 @@
               </a:ln>
               <a:extLst>
                 <a:ext uri="{91240B29-F687-4f45-9708-019B960494DF}">
-                  <a14:hiddenLine xmlns:a14="http://schemas.microsoft.com/office/drawing/2010/main" xmlns="" w="9525">
+                  <a14:hiddenLine xmlns="" xmlns:a14="http://schemas.microsoft.com/office/drawing/2010/main" w="9525">
                     <a:solidFill>
                       <a:srgbClr val="000000"/>
                     </a:solidFill>
@@ -10351,7 +10351,7 @@
               </a:ln>
               <a:extLst>
                 <a:ext uri="{91240B29-F687-4f45-9708-019B960494DF}">
-                  <a14:hiddenLine xmlns:a14="http://schemas.microsoft.com/office/drawing/2010/main" xmlns="" w="9525">
+                  <a14:hiddenLine xmlns="" xmlns:a14="http://schemas.microsoft.com/office/drawing/2010/main" w="9525">
                     <a:solidFill>
                       <a:srgbClr val="000000"/>
                     </a:solidFill>
@@ -10413,7 +10413,7 @@
               </a:ln>
               <a:extLst>
                 <a:ext uri="{91240B29-F687-4f45-9708-019B960494DF}">
-                  <a14:hiddenLine xmlns:a14="http://schemas.microsoft.com/office/drawing/2010/main" xmlns="" w="9525">
+                  <a14:hiddenLine xmlns="" xmlns:a14="http://schemas.microsoft.com/office/drawing/2010/main" w="9525">
                     <a:solidFill>
                       <a:srgbClr val="000000"/>
                     </a:solidFill>
@@ -10503,7 +10503,7 @@
               </a:ln>
               <a:extLst>
                 <a:ext uri="{91240B29-F687-4f45-9708-019B960494DF}">
-                  <a14:hiddenLine xmlns:a14="http://schemas.microsoft.com/office/drawing/2010/main" xmlns="" w="9525">
+                  <a14:hiddenLine xmlns="" xmlns:a14="http://schemas.microsoft.com/office/drawing/2010/main" w="9525">
                     <a:solidFill>
                       <a:srgbClr val="000000"/>
                     </a:solidFill>
@@ -10568,7 +10568,7 @@
               </a:ln>
               <a:extLst>
                 <a:ext uri="{91240B29-F687-4f45-9708-019B960494DF}">
-                  <a14:hiddenLine xmlns:a14="http://schemas.microsoft.com/office/drawing/2010/main" xmlns="" w="9525">
+                  <a14:hiddenLine xmlns="" xmlns:a14="http://schemas.microsoft.com/office/drawing/2010/main" w="9525">
                     <a:solidFill>
                       <a:srgbClr val="000000"/>
                     </a:solidFill>
@@ -10630,7 +10630,7 @@
               </a:ln>
               <a:extLst>
                 <a:ext uri="{91240B29-F687-4f45-9708-019B960494DF}">
-                  <a14:hiddenLine xmlns:a14="http://schemas.microsoft.com/office/drawing/2010/main" xmlns="" w="9525">
+                  <a14:hiddenLine xmlns="" xmlns:a14="http://schemas.microsoft.com/office/drawing/2010/main" w="9525">
                     <a:solidFill>
                       <a:srgbClr val="000000"/>
                     </a:solidFill>
@@ -10720,7 +10720,7 @@
               </a:ln>
               <a:extLst>
                 <a:ext uri="{91240B29-F687-4f45-9708-019B960494DF}">
-                  <a14:hiddenLine xmlns:a14="http://schemas.microsoft.com/office/drawing/2010/main" xmlns="" w="9525">
+                  <a14:hiddenLine xmlns="" xmlns:a14="http://schemas.microsoft.com/office/drawing/2010/main" w="9525">
                     <a:solidFill>
                       <a:srgbClr val="000000"/>
                     </a:solidFill>
@@ -10810,7 +10810,7 @@
               </a:ln>
               <a:extLst>
                 <a:ext uri="{91240B29-F687-4f45-9708-019B960494DF}">
-                  <a14:hiddenLine xmlns:a14="http://schemas.microsoft.com/office/drawing/2010/main" xmlns="" w="9525">
+                  <a14:hiddenLine xmlns="" xmlns:a14="http://schemas.microsoft.com/office/drawing/2010/main" w="9525">
                     <a:solidFill>
                       <a:srgbClr val="000000"/>
                     </a:solidFill>
@@ -10875,7 +10875,7 @@
               </a:ln>
               <a:extLst>
                 <a:ext uri="{91240B29-F687-4f45-9708-019B960494DF}">
-                  <a14:hiddenLine xmlns:a14="http://schemas.microsoft.com/office/drawing/2010/main" xmlns="" w="9525">
+                  <a14:hiddenLine xmlns="" xmlns:a14="http://schemas.microsoft.com/office/drawing/2010/main" w="9525">
                     <a:solidFill>
                       <a:srgbClr val="000000"/>
                     </a:solidFill>
@@ -10995,7 +10995,7 @@
               </a:ln>
               <a:extLst>
                 <a:ext uri="{91240B29-F687-4f45-9708-019B960494DF}">
-                  <a14:hiddenLine xmlns:a14="http://schemas.microsoft.com/office/drawing/2010/main" xmlns="" w="9525">
+                  <a14:hiddenLine xmlns="" xmlns:a14="http://schemas.microsoft.com/office/drawing/2010/main" w="9525">
                     <a:solidFill>
                       <a:srgbClr val="000000"/>
                     </a:solidFill>
@@ -11093,7 +11093,7 @@
               </a:ln>
               <a:extLst>
                 <a:ext uri="{91240B29-F687-4f45-9708-019B960494DF}">
-                  <a14:hiddenLine xmlns:a14="http://schemas.microsoft.com/office/drawing/2010/main" xmlns="" w="9525">
+                  <a14:hiddenLine xmlns="" xmlns:a14="http://schemas.microsoft.com/office/drawing/2010/main" w="9525">
                     <a:solidFill>
                       <a:srgbClr val="000000"/>
                     </a:solidFill>
@@ -11208,7 +11208,7 @@
               </a:ln>
               <a:extLst>
                 <a:ext uri="{91240B29-F687-4f45-9708-019B960494DF}">
-                  <a14:hiddenLine xmlns:a14="http://schemas.microsoft.com/office/drawing/2010/main" xmlns="" w="9525">
+                  <a14:hiddenLine xmlns="" xmlns:a14="http://schemas.microsoft.com/office/drawing/2010/main" w="9525">
                     <a:solidFill>
                       <a:srgbClr val="000000"/>
                     </a:solidFill>
@@ -11298,7 +11298,7 @@
               </a:ln>
               <a:extLst>
                 <a:ext uri="{91240B29-F687-4f45-9708-019B960494DF}">
-                  <a14:hiddenLine xmlns:a14="http://schemas.microsoft.com/office/drawing/2010/main" xmlns="" w="9525">
+                  <a14:hiddenLine xmlns="" xmlns:a14="http://schemas.microsoft.com/office/drawing/2010/main" w="9525">
                     <a:solidFill>
                       <a:srgbClr val="000000"/>
                     </a:solidFill>
@@ -11363,7 +11363,7 @@
               </a:ln>
               <a:extLst>
                 <a:ext uri="{91240B29-F687-4f45-9708-019B960494DF}">
-                  <a14:hiddenLine xmlns:a14="http://schemas.microsoft.com/office/drawing/2010/main" xmlns="" w="9525">
+                  <a14:hiddenLine xmlns="" xmlns:a14="http://schemas.microsoft.com/office/drawing/2010/main" w="9525">
                     <a:solidFill>
                       <a:srgbClr val="000000"/>
                     </a:solidFill>
@@ -11453,7 +11453,7 @@
               </a:ln>
               <a:extLst>
                 <a:ext uri="{91240B29-F687-4f45-9708-019B960494DF}">
-                  <a14:hiddenLine xmlns:a14="http://schemas.microsoft.com/office/drawing/2010/main" xmlns="" w="9525">
+                  <a14:hiddenLine xmlns="" xmlns:a14="http://schemas.microsoft.com/office/drawing/2010/main" w="9525">
                     <a:solidFill>
                       <a:srgbClr val="000000"/>
                     </a:solidFill>
@@ -11521,7 +11521,7 @@
               </a:ln>
               <a:extLst>
                 <a:ext uri="{91240B29-F687-4f45-9708-019B960494DF}">
-                  <a14:hiddenLine xmlns:a14="http://schemas.microsoft.com/office/drawing/2010/main" xmlns="" w="9525">
+                  <a14:hiddenLine xmlns="" xmlns:a14="http://schemas.microsoft.com/office/drawing/2010/main" w="9525">
                     <a:solidFill>
                       <a:srgbClr val="000000"/>
                     </a:solidFill>
@@ -11611,7 +11611,7 @@
               </a:ln>
               <a:extLst>
                 <a:ext uri="{91240B29-F687-4f45-9708-019B960494DF}">
-                  <a14:hiddenLine xmlns:a14="http://schemas.microsoft.com/office/drawing/2010/main" xmlns="" w="9525">
+                  <a14:hiddenLine xmlns="" xmlns:a14="http://schemas.microsoft.com/office/drawing/2010/main" w="9525">
                     <a:solidFill>
                       <a:srgbClr val="000000"/>
                     </a:solidFill>
@@ -11679,7 +11679,7 @@
               </a:ln>
               <a:extLst>
                 <a:ext uri="{91240B29-F687-4f45-9708-019B960494DF}">
-                  <a14:hiddenLine xmlns:a14="http://schemas.microsoft.com/office/drawing/2010/main" xmlns="" w="9525">
+                  <a14:hiddenLine xmlns="" xmlns:a14="http://schemas.microsoft.com/office/drawing/2010/main" w="9525">
                     <a:solidFill>
                       <a:srgbClr val="000000"/>
                     </a:solidFill>
@@ -11769,7 +11769,7 @@
               </a:ln>
               <a:extLst>
                 <a:ext uri="{91240B29-F687-4f45-9708-019B960494DF}">
-                  <a14:hiddenLine xmlns:a14="http://schemas.microsoft.com/office/drawing/2010/main" xmlns="" w="9525">
+                  <a14:hiddenLine xmlns="" xmlns:a14="http://schemas.microsoft.com/office/drawing/2010/main" w="9525">
                     <a:solidFill>
                       <a:srgbClr val="000000"/>
                     </a:solidFill>
@@ -11803,7 +11803,7 @@
               </a:ln>
               <a:extLst>
                 <a:ext uri="{91240B29-F687-4f45-9708-019B960494DF}">
-                  <a14:hiddenLine xmlns:a14="http://schemas.microsoft.com/office/drawing/2010/main" xmlns="" w="9525">
+                  <a14:hiddenLine xmlns="" xmlns:a14="http://schemas.microsoft.com/office/drawing/2010/main" w="9525">
                     <a:solidFill>
                       <a:srgbClr val="000000"/>
                     </a:solidFill>
@@ -11873,35 +11873,35 @@
           <a:p>
             <a:pPr lvl="0"/>
             <a:r>
-              <a:rPr lang="en-US" smtClean="0"/>
+              <a:rPr lang="en-US"/>
               <a:t>Click to edit Master text styles</a:t>
             </a:r>
           </a:p>
           <a:p>
             <a:pPr lvl="1"/>
             <a:r>
-              <a:rPr lang="en-US" smtClean="0"/>
+              <a:rPr lang="en-US"/>
               <a:t>Second level</a:t>
             </a:r>
           </a:p>
           <a:p>
             <a:pPr lvl="2"/>
             <a:r>
-              <a:rPr lang="en-US" smtClean="0"/>
+              <a:rPr lang="en-US"/>
               <a:t>Third level</a:t>
             </a:r>
           </a:p>
           <a:p>
             <a:pPr lvl="3"/>
             <a:r>
-              <a:rPr lang="en-US" smtClean="0"/>
+              <a:rPr lang="en-US"/>
               <a:t>Fourth level</a:t>
             </a:r>
           </a:p>
           <a:p>
             <a:pPr lvl="4"/>
             <a:r>
-              <a:rPr lang="en-US" smtClean="0"/>
+              <a:rPr lang="en-US"/>
               <a:t>Fifth level</a:t>
             </a:r>
             <a:endParaRPr lang="en-US" dirty="0"/>
@@ -12376,10 +12376,9 @@
           <a:lstStyle/>
           <a:p>
             <a:r>
-              <a:rPr lang="en-US" dirty="0" smtClean="0"/>
+              <a:rPr lang="en-US" dirty="0"/>
               <a:t>Family budget project</a:t>
             </a:r>
-            <a:endParaRPr lang="en-US" dirty="0"/>
           </a:p>
         </p:txBody>
       </p:sp>
@@ -12406,7 +12405,7 @@
           <a:lstStyle/>
           <a:p>
             <a:r>
-              <a:rPr lang="en-US" dirty="0" smtClean="0"/>
+              <a:rPr lang="en-US" dirty="0"/>
               <a:t>An easy to use household finances management</a:t>
             </a:r>
           </a:p>
@@ -12415,32 +12414,31 @@
           </a:p>
           <a:p>
             <a:r>
-              <a:rPr lang="en-US" dirty="0" smtClean="0"/>
+              <a:rPr lang="en-US" dirty="0"/>
               <a:t>Tung </a:t>
             </a:r>
             <a:r>
-              <a:rPr lang="en-US" dirty="0" err="1" smtClean="0"/>
+              <a:rPr lang="en-US" dirty="0" err="1"/>
               <a:t>pham</a:t>
             </a:r>
-            <a:endParaRPr lang="en-US" dirty="0" smtClean="0"/>
+            <a:endParaRPr lang="en-US" dirty="0"/>
           </a:p>
           <a:p>
             <a:r>
-              <a:rPr lang="en-US" dirty="0" smtClean="0"/>
+              <a:rPr lang="en-US" dirty="0"/>
               <a:t>Larisa </a:t>
             </a:r>
             <a:r>
-              <a:rPr lang="en-US" dirty="0" err="1" smtClean="0"/>
+              <a:rPr lang="en-US" dirty="0" err="1"/>
               <a:t>sabalin</a:t>
             </a:r>
-            <a:endParaRPr lang="en-US" dirty="0" smtClean="0"/>
+            <a:endParaRPr lang="en-US" dirty="0"/>
           </a:p>
           <a:p>
             <a:r>
-              <a:rPr lang="en-US" dirty="0" smtClean="0"/>
+              <a:rPr lang="en-US" dirty="0"/>
               <a:t>						JAC, ipd-12, March 2018</a:t>
             </a:r>
-            <a:endParaRPr lang="en-US" dirty="0"/>
           </a:p>
         </p:txBody>
       </p:sp>
@@ -12495,10 +12493,9 @@
           <a:lstStyle/>
           <a:p>
             <a:r>
-              <a:rPr lang="en-US" dirty="0" smtClean="0"/>
+              <a:rPr lang="en-US" dirty="0"/>
               <a:t>What we learned</a:t>
             </a:r>
-            <a:endParaRPr lang="en-US" dirty="0"/>
           </a:p>
         </p:txBody>
       </p:sp>
@@ -12648,10 +12645,9 @@
           <a:lstStyle/>
           <a:p>
             <a:r>
-              <a:rPr lang="en-US" dirty="0" smtClean="0"/>
+              <a:rPr lang="en-US" dirty="0"/>
               <a:t>Future work</a:t>
             </a:r>
-            <a:endParaRPr lang="en-US" dirty="0"/>
           </a:p>
         </p:txBody>
       </p:sp>
@@ -12678,37 +12674,37 @@
           <a:lstStyle/>
           <a:p>
             <a:r>
-              <a:rPr lang="en-US" dirty="0" smtClean="0"/>
+              <a:rPr lang="en-US" dirty="0"/>
               <a:t>Export different parts of the file to CSV</a:t>
             </a:r>
           </a:p>
           <a:p>
             <a:r>
-              <a:rPr lang="en-US" dirty="0" smtClean="0"/>
+              <a:rPr lang="en-US" dirty="0"/>
               <a:t>Add more options to the Details view as: all the family information, category of the information written(expense, income, budget), give the option of pulling the information by month, quarter, year.</a:t>
             </a:r>
           </a:p>
           <a:p>
             <a:r>
-              <a:rPr lang="en-US" dirty="0" smtClean="0"/>
+              <a:rPr lang="en-US" dirty="0"/>
               <a:t>Add more categories for budgets and expenses.</a:t>
             </a:r>
           </a:p>
           <a:p>
             <a:r>
-              <a:rPr lang="en-US" dirty="0" smtClean="0"/>
+              <a:rPr lang="en-US" dirty="0"/>
               <a:t>Set the check for the uniqueness of the family.</a:t>
             </a:r>
           </a:p>
           <a:p>
             <a:r>
-              <a:rPr lang="en-US" dirty="0" smtClean="0"/>
+              <a:rPr lang="en-US" dirty="0"/>
               <a:t>Create the algorithm of the budget calculation  based on percentage of the previous expenses.</a:t>
             </a:r>
           </a:p>
           <a:p>
             <a:r>
-              <a:rPr lang="en-US" dirty="0" smtClean="0"/>
+              <a:rPr lang="en-US" dirty="0"/>
               <a:t>Give the option of choice for the budget planning(Manual or Statistical).</a:t>
             </a:r>
           </a:p>
@@ -12768,10 +12764,9 @@
           <a:lstStyle/>
           <a:p>
             <a:r>
-              <a:rPr lang="en-US" dirty="0" smtClean="0"/>
+              <a:rPr lang="en-US" dirty="0"/>
               <a:t>Summary</a:t>
             </a:r>
-            <a:endParaRPr lang="en-US" dirty="0"/>
           </a:p>
         </p:txBody>
       </p:sp>
@@ -12840,10 +12835,9 @@
           <a:lstStyle/>
           <a:p>
             <a:r>
-              <a:rPr lang="en-US" dirty="0" smtClean="0"/>
+              <a:rPr lang="en-US" dirty="0"/>
               <a:t>When you may need this tool</a:t>
             </a:r>
-            <a:endParaRPr lang="en-US" dirty="0"/>
           </a:p>
         </p:txBody>
       </p:sp>
@@ -12865,28 +12859,27 @@
           <a:lstStyle/>
           <a:p>
             <a:r>
-              <a:rPr lang="en-US" dirty="0" smtClean="0"/>
+              <a:rPr lang="en-US" dirty="0"/>
               <a:t>When you want to understand on what are you spending too much.</a:t>
             </a:r>
           </a:p>
           <a:p>
             <a:r>
-              <a:rPr lang="en-US" dirty="0" smtClean="0"/>
+              <a:rPr lang="en-US" dirty="0"/>
               <a:t>When you decide to find the type of expenses you can lower in order to save some money for something else.</a:t>
             </a:r>
           </a:p>
           <a:p>
             <a:r>
-              <a:rPr lang="en-US" dirty="0" smtClean="0"/>
+              <a:rPr lang="en-US" dirty="0"/>
               <a:t>When you income changes suddenly and you need to change the spending behavior.</a:t>
             </a:r>
           </a:p>
           <a:p>
             <a:r>
-              <a:rPr lang="en-US" dirty="0" smtClean="0"/>
+              <a:rPr lang="en-US" dirty="0"/>
               <a:t>When you what to be more conscious of your spending vs income and vs budget.</a:t>
             </a:r>
-            <a:endParaRPr lang="en-US" dirty="0"/>
           </a:p>
         </p:txBody>
       </p:sp>
@@ -12936,10 +12929,9 @@
           <a:lstStyle/>
           <a:p>
             <a:r>
-              <a:rPr lang="en-US" dirty="0" smtClean="0"/>
+              <a:rPr lang="en-US" dirty="0"/>
               <a:t>What are the features it offers</a:t>
             </a:r>
-            <a:endParaRPr lang="en-US" dirty="0"/>
           </a:p>
         </p:txBody>
       </p:sp>
@@ -12959,25 +12951,25 @@
           <a:lstStyle/>
           <a:p>
             <a:r>
-              <a:rPr lang="en-US" dirty="0" smtClean="0"/>
+              <a:rPr lang="en-US" dirty="0"/>
               <a:t>Adding information on spending and income as well as planning a budget for the first time users.</a:t>
             </a:r>
           </a:p>
           <a:p>
             <a:r>
-              <a:rPr lang="en-US" dirty="0" smtClean="0"/>
+              <a:rPr lang="en-US" dirty="0"/>
               <a:t>Adding current instances of expenses and income.</a:t>
             </a:r>
           </a:p>
           <a:p>
             <a:r>
-              <a:rPr lang="en-US" dirty="0" smtClean="0"/>
+              <a:rPr lang="en-US" dirty="0"/>
               <a:t>Seeing in a table the current state on your file for past transactions and budget.</a:t>
             </a:r>
           </a:p>
           <a:p>
             <a:r>
-              <a:rPr lang="en-US" dirty="0" smtClean="0"/>
+              <a:rPr lang="en-US" dirty="0"/>
               <a:t>Saving to file the information on the past transactions and budget.</a:t>
             </a:r>
           </a:p>
@@ -13034,10 +13026,9 @@
           <a:lstStyle/>
           <a:p>
             <a:r>
-              <a:rPr lang="en-US" dirty="0" smtClean="0"/>
+              <a:rPr lang="en-US" dirty="0"/>
               <a:t>Solution overview</a:t>
             </a:r>
-            <a:endParaRPr lang="en-US" dirty="0"/>
           </a:p>
         </p:txBody>
       </p:sp>
@@ -13124,22 +13115,21 @@
           <a:lstStyle/>
           <a:p>
             <a:r>
-              <a:rPr lang="en-US" dirty="0" smtClean="0"/>
+              <a:rPr lang="en-US" dirty="0"/>
               <a:t>You open the app and you are prompted with a  login window.</a:t>
             </a:r>
           </a:p>
           <a:p>
             <a:r>
-              <a:rPr lang="en-US" dirty="0" smtClean="0"/>
+              <a:rPr lang="en-US" dirty="0"/>
               <a:t>You have the option of registering to get started.</a:t>
             </a:r>
           </a:p>
           <a:p>
             <a:r>
-              <a:rPr lang="en-US" dirty="0" smtClean="0"/>
+              <a:rPr lang="en-US" dirty="0"/>
               <a:t>You will be assign to a unique family. So you need to keep in mind the Family name and the Family Unified Code to use for all your household members.</a:t>
             </a:r>
-            <a:endParaRPr lang="en-US" dirty="0"/>
           </a:p>
         </p:txBody>
       </p:sp>
@@ -13223,16 +13213,15 @@
           <a:lstStyle/>
           <a:p>
             <a:r>
-              <a:rPr lang="en-US" dirty="0" smtClean="0"/>
+              <a:rPr lang="en-US" dirty="0"/>
               <a:t>When accessing you file you get all the basic information about your file on the Welcome Frame. </a:t>
             </a:r>
           </a:p>
           <a:p>
             <a:r>
-              <a:rPr lang="en-US" dirty="0" smtClean="0"/>
+              <a:rPr lang="en-US" dirty="0"/>
               <a:t>Additional information on details may be accessed in the details view.</a:t>
             </a:r>
-            <a:endParaRPr lang="en-US" dirty="0"/>
           </a:p>
         </p:txBody>
       </p:sp>
@@ -13338,8 +13327,8 @@
         </p:nvSpPr>
         <p:spPr>
           <a:xfrm>
-            <a:off x="1141413" y="618518"/>
-            <a:ext cx="9905998" cy="656367"/>
+            <a:off x="1141413" y="407963"/>
+            <a:ext cx="3261775" cy="5706793"/>
           </a:xfrm>
         </p:spPr>
         <p:txBody>
@@ -13347,75 +13336,45 @@
           <a:lstStyle/>
           <a:p>
             <a:r>
-              <a:rPr lang="en-US" dirty="0" smtClean="0"/>
+              <a:rPr lang="en-US" dirty="0"/>
               <a:t>Challenges and solutions</a:t>
             </a:r>
-            <a:endParaRPr lang="en-US" dirty="0"/>
           </a:p>
         </p:txBody>
       </p:sp>
-      <p:sp>
-        <p:nvSpPr>
-          <p:cNvPr id="3" name="Content Placeholder 2"/>
-          <p:cNvSpPr>
-            <a:spLocks noGrp="1"/>
-          </p:cNvSpPr>
+      <p:pic>
+        <p:nvPicPr>
+          <p:cNvPr id="5" name="Content Placeholder 4" descr="A screenshot of a cell phone&#10;&#10;Description generated with high confidence">
+            <a:extLst>
+              <a:ext uri="{FF2B5EF4-FFF2-40B4-BE49-F238E27FC236}">
+                <a16:creationId xmlns:a16="http://schemas.microsoft.com/office/drawing/2014/main" id="{679D44B7-2A0E-4BFE-AA04-3EADFEC2AFB2}"/>
+              </a:ext>
+            </a:extLst>
+          </p:cNvPr>
+          <p:cNvPicPr>
+            <a:picLocks noGrp="1" noChangeAspect="1"/>
+          </p:cNvPicPr>
           <p:nvPr>
             <p:ph idx="1"/>
           </p:nvPr>
-        </p:nvSpPr>
+        </p:nvPicPr>
+        <p:blipFill>
+          <a:blip r:embed="rId2"/>
+          <a:stretch>
+            <a:fillRect/>
+          </a:stretch>
+        </p:blipFill>
         <p:spPr>
           <a:xfrm>
-            <a:off x="1141412" y="1573823"/>
-            <a:ext cx="4767019" cy="4217378"/>
+            <a:off x="4848308" y="407963"/>
+            <a:ext cx="6199104" cy="5706793"/>
           </a:xfrm>
         </p:spPr>
-        <p:txBody>
-          <a:bodyPr/>
-          <a:lstStyle/>
-          <a:p>
-            <a:r>
-              <a:rPr lang="en-US" dirty="0" err="1" smtClean="0"/>
-              <a:t>Git</a:t>
-            </a:r>
-            <a:endParaRPr lang="en-US" dirty="0" smtClean="0"/>
-          </a:p>
-          <a:p>
-            <a:r>
-              <a:rPr lang="en-US" dirty="0" smtClean="0"/>
-              <a:t>Multi-Querying from a free database</a:t>
-            </a:r>
-          </a:p>
-          <a:p>
-            <a:endParaRPr lang="en-US" dirty="0" smtClean="0"/>
-          </a:p>
-          <a:p>
-            <a:r>
-              <a:rPr lang="en-US" dirty="0" smtClean="0"/>
-              <a:t>Connecting all the information on one user to the whole system.</a:t>
-            </a:r>
-          </a:p>
-          <a:p>
-            <a:r>
-              <a:rPr lang="en-US" dirty="0" smtClean="0"/>
-              <a:t>Login and Registration</a:t>
-            </a:r>
-          </a:p>
-          <a:p>
-            <a:pPr marL="0" indent="0">
-              <a:buNone/>
-            </a:pPr>
-            <a:endParaRPr lang="en-US" dirty="0" smtClean="0"/>
-          </a:p>
-          <a:p>
-            <a:endParaRPr lang="en-US" dirty="0"/>
-          </a:p>
-        </p:txBody>
-      </p:sp>
+      </p:pic>
     </p:spTree>
     <p:extLst>
       <p:ext uri="{BB962C8B-B14F-4D97-AF65-F5344CB8AC3E}">
-        <p14:creationId xmlns:p14="http://schemas.microsoft.com/office/powerpoint/2010/main" val="2029586540"/>
+        <p14:creationId xmlns:p14="http://schemas.microsoft.com/office/powerpoint/2010/main" val="3440877932"/>
       </p:ext>
     </p:extLst>
   </p:cSld>
@@ -13455,7 +13414,7 @@
         <p:spPr>
           <a:xfrm>
             <a:off x="1141413" y="618518"/>
-            <a:ext cx="9905998" cy="586028"/>
+            <a:ext cx="9905998" cy="656367"/>
           </a:xfrm>
         </p:spPr>
         <p:txBody>
@@ -13479,19 +13438,58 @@
             <p:ph idx="1"/>
           </p:nvPr>
         </p:nvSpPr>
-        <p:spPr/>
+        <p:spPr>
+          <a:xfrm>
+            <a:off x="1141412" y="1573823"/>
+            <a:ext cx="4767019" cy="4217378"/>
+          </a:xfrm>
+        </p:spPr>
         <p:txBody>
           <a:bodyPr/>
           <a:lstStyle/>
           <a:p>
-            <a:endParaRPr lang="en-US"/>
+            <a:r>
+              <a:rPr lang="en-US" dirty="0" err="1"/>
+              <a:t>Git</a:t>
+            </a:r>
+            <a:endParaRPr lang="en-US" dirty="0"/>
+          </a:p>
+          <a:p>
+            <a:r>
+              <a:rPr lang="en-US" dirty="0"/>
+              <a:t>Multi-Querying from a free database</a:t>
+            </a:r>
+          </a:p>
+          <a:p>
+            <a:endParaRPr lang="en-US" dirty="0"/>
+          </a:p>
+          <a:p>
+            <a:r>
+              <a:rPr lang="en-US" dirty="0"/>
+              <a:t>Connecting all the information on one user to the whole system.</a:t>
+            </a:r>
+          </a:p>
+          <a:p>
+            <a:r>
+              <a:rPr lang="en-US" dirty="0"/>
+              <a:t>Login and Registration</a:t>
+            </a:r>
+          </a:p>
+          <a:p>
+            <a:pPr marL="0" indent="0">
+              <a:buNone/>
+            </a:pPr>
+            <a:endParaRPr lang="en-US" dirty="0"/>
+          </a:p>
+          <a:p>
+            <a:endParaRPr lang="en-US" dirty="0"/>
           </a:p>
         </p:txBody>
       </p:sp>
     </p:spTree>
     <p:extLst>
       <p:ext uri="{BB962C8B-B14F-4D97-AF65-F5344CB8AC3E}">
-        <p14:creationId xmlns:p14="http://schemas.microsoft.com/office/powerpoint/2010/main" val="3440877932"/>
+        <p14:creationId xmlns:p14="http://schemas.microsoft.com/office/powerpoint/2010/main" val="2029586540"/>
       </p:ext>
     </p:extLst>
   </p:cSld>
@@ -13531,12 +13529,12 @@
         <p:spPr>
           <a:xfrm>
             <a:off x="1141413" y="618518"/>
-            <a:ext cx="9905998" cy="665159"/>
+            <a:ext cx="3135165" cy="985199"/>
           </a:xfrm>
         </p:spPr>
         <p:txBody>
           <a:bodyPr>
-            <a:normAutofit/>
+            <a:normAutofit fontScale="90000"/>
           </a:bodyPr>
           <a:lstStyle/>
           <a:p>
@@ -13547,25 +13545,35 @@
           </a:p>
         </p:txBody>
       </p:sp>
-      <p:sp>
-        <p:nvSpPr>
-          <p:cNvPr id="3" name="Content Placeholder 2"/>
-          <p:cNvSpPr>
-            <a:spLocks noGrp="1"/>
-          </p:cNvSpPr>
+      <p:pic>
+        <p:nvPicPr>
+          <p:cNvPr id="5" name="Content Placeholder 4" descr="A screenshot of a social media post&#10;&#10;Description generated with very high confidence">
+            <a:extLst>
+              <a:ext uri="{FF2B5EF4-FFF2-40B4-BE49-F238E27FC236}">
+                <a16:creationId xmlns:a16="http://schemas.microsoft.com/office/drawing/2014/main" id="{DCE8A179-2AC3-496B-920F-FA5363B20A4D}"/>
+              </a:ext>
+            </a:extLst>
+          </p:cNvPr>
+          <p:cNvPicPr>
+            <a:picLocks noGrp="1" noChangeAspect="1"/>
+          </p:cNvPicPr>
           <p:nvPr>
             <p:ph idx="1"/>
           </p:nvPr>
-        </p:nvSpPr>
-        <p:spPr/>
-        <p:txBody>
-          <a:bodyPr/>
-          <a:lstStyle/>
-          <a:p>
-            <a:endParaRPr lang="en-US"/>
-          </a:p>
-        </p:txBody>
-      </p:sp>
+        </p:nvPicPr>
+        <p:blipFill>
+          <a:blip r:embed="rId2"/>
+          <a:stretch>
+            <a:fillRect/>
+          </a:stretch>
+        </p:blipFill>
+        <p:spPr>
+          <a:xfrm>
+            <a:off x="4473526" y="618519"/>
+            <a:ext cx="7066826" cy="5754146"/>
+          </a:xfrm>
+        </p:spPr>
+      </p:pic>
     </p:spTree>
     <p:extLst>
       <p:ext uri="{BB962C8B-B14F-4D97-AF65-F5344CB8AC3E}">

</xml_diff>